<commit_message>
updating figure size of flowchart
</commit_message>
<xml_diff>
--- a/figure/RiverWareFlowChart.pptx
+++ b/figure/RiverWareFlowChart.pptx
@@ -2,13 +2,12 @@
 <file path=ppt/presentation.xml><?xml version="1.0" encoding="utf-8"?>
 <p:presentation xmlns:a="http://schemas.openxmlformats.org/drawingml/2006/main" xmlns:r="http://schemas.openxmlformats.org/officeDocument/2006/relationships" xmlns:p="http://schemas.openxmlformats.org/presentationml/2006/main" saveSubsetFonts="1">
   <p:sldMasterIdLst>
-    <p:sldMasterId id="2147483660" r:id="rId1"/>
+    <p:sldMasterId id="2147483672" r:id="rId1"/>
   </p:sldMasterIdLst>
   <p:sldIdLst>
     <p:sldId id="257" r:id="rId2"/>
-    <p:sldId id="258" r:id="rId3"/>
   </p:sldIdLst>
-  <p:sldSz cx="6858000" cy="9144000" type="letter"/>
+  <p:sldSz cx="6858000" cy="5486400"/>
   <p:notesSz cx="6858000" cy="9144000"/>
   <p:defaultTextStyle>
     <a:defPPr>
@@ -105,6 +104,11 @@
       </a:defRPr>
     </a:lvl9pPr>
   </p:defaultTextStyle>
+  <p:extLst>
+    <p:ext uri="{EFAFB233-063F-42B5-8137-9DF3F51BA10A}">
+      <p15:sldGuideLst xmlns:p15="http://schemas.microsoft.com/office/powerpoint/2012/main"/>
+    </p:ext>
+  </p:extLst>
 </p:presentation>
 </file>
 
@@ -137,8 +141,8 @@
         </p:nvSpPr>
         <p:spPr>
           <a:xfrm>
-            <a:off x="514350" y="1496484"/>
-            <a:ext cx="5829300" cy="3183467"/>
+            <a:off x="514350" y="897890"/>
+            <a:ext cx="5829300" cy="1910080"/>
           </a:xfrm>
         </p:spPr>
         <p:txBody>
@@ -169,8 +173,8 @@
         </p:nvSpPr>
         <p:spPr>
           <a:xfrm>
-            <a:off x="857250" y="4802717"/>
-            <a:ext cx="5143500" cy="2207683"/>
+            <a:off x="857250" y="2881630"/>
+            <a:ext cx="5143500" cy="1324610"/>
           </a:xfrm>
         </p:spPr>
         <p:txBody>
@@ -239,7 +243,7 @@
           <a:p>
             <a:fld id="{2CC38724-DE8D-4C18-A4F6-D9BF68B2D7FD}" type="datetimeFigureOut">
               <a:rPr lang="en-US" smtClean="0"/>
-              <a:t>3/5/2018</a:t>
+              <a:t>3/6/2018</a:t>
             </a:fld>
             <a:endParaRPr lang="en-US"/>
           </a:p>
@@ -290,7 +294,7 @@
     </p:spTree>
     <p:extLst>
       <p:ext uri="{BB962C8B-B14F-4D97-AF65-F5344CB8AC3E}">
-        <p14:creationId xmlns:p14="http://schemas.microsoft.com/office/powerpoint/2010/main" val="2060882509"/>
+        <p14:creationId xmlns:p14="http://schemas.microsoft.com/office/powerpoint/2010/main" val="3693351568"/>
       </p:ext>
     </p:extLst>
   </p:cSld>
@@ -409,7 +413,7 @@
           <a:p>
             <a:fld id="{2CC38724-DE8D-4C18-A4F6-D9BF68B2D7FD}" type="datetimeFigureOut">
               <a:rPr lang="en-US" smtClean="0"/>
-              <a:t>3/5/2018</a:t>
+              <a:t>3/6/2018</a:t>
             </a:fld>
             <a:endParaRPr lang="en-US"/>
           </a:p>
@@ -460,7 +464,7 @@
     </p:spTree>
     <p:extLst>
       <p:ext uri="{BB962C8B-B14F-4D97-AF65-F5344CB8AC3E}">
-        <p14:creationId xmlns:p14="http://schemas.microsoft.com/office/powerpoint/2010/main" val="3033556065"/>
+        <p14:creationId xmlns:p14="http://schemas.microsoft.com/office/powerpoint/2010/main" val="2050646404"/>
       </p:ext>
     </p:extLst>
   </p:cSld>
@@ -499,8 +503,8 @@
         </p:nvSpPr>
         <p:spPr>
           <a:xfrm>
-            <a:off x="4907757" y="486834"/>
-            <a:ext cx="1478756" cy="7749117"/>
+            <a:off x="4907757" y="292100"/>
+            <a:ext cx="1478756" cy="4649470"/>
           </a:xfrm>
         </p:spPr>
         <p:txBody>
@@ -527,8 +531,8 @@
         </p:nvSpPr>
         <p:spPr>
           <a:xfrm>
-            <a:off x="471488" y="486834"/>
-            <a:ext cx="4350544" cy="7749117"/>
+            <a:off x="471488" y="292100"/>
+            <a:ext cx="4350544" cy="4649470"/>
           </a:xfrm>
         </p:spPr>
         <p:txBody>
@@ -589,7 +593,7 @@
           <a:p>
             <a:fld id="{2CC38724-DE8D-4C18-A4F6-D9BF68B2D7FD}" type="datetimeFigureOut">
               <a:rPr lang="en-US" smtClean="0"/>
-              <a:t>3/5/2018</a:t>
+              <a:t>3/6/2018</a:t>
             </a:fld>
             <a:endParaRPr lang="en-US"/>
           </a:p>
@@ -640,7 +644,7 @@
     </p:spTree>
     <p:extLst>
       <p:ext uri="{BB962C8B-B14F-4D97-AF65-F5344CB8AC3E}">
-        <p14:creationId xmlns:p14="http://schemas.microsoft.com/office/powerpoint/2010/main" val="1242073777"/>
+        <p14:creationId xmlns:p14="http://schemas.microsoft.com/office/powerpoint/2010/main" val="72907512"/>
       </p:ext>
     </p:extLst>
   </p:cSld>
@@ -759,7 +763,7 @@
           <a:p>
             <a:fld id="{2CC38724-DE8D-4C18-A4F6-D9BF68B2D7FD}" type="datetimeFigureOut">
               <a:rPr lang="en-US" smtClean="0"/>
-              <a:t>3/5/2018</a:t>
+              <a:t>3/6/2018</a:t>
             </a:fld>
             <a:endParaRPr lang="en-US"/>
           </a:p>
@@ -810,7 +814,7 @@
     </p:spTree>
     <p:extLst>
       <p:ext uri="{BB962C8B-B14F-4D97-AF65-F5344CB8AC3E}">
-        <p14:creationId xmlns:p14="http://schemas.microsoft.com/office/powerpoint/2010/main" val="2170573217"/>
+        <p14:creationId xmlns:p14="http://schemas.microsoft.com/office/powerpoint/2010/main" val="2578746681"/>
       </p:ext>
     </p:extLst>
   </p:cSld>
@@ -849,8 +853,8 @@
         </p:nvSpPr>
         <p:spPr>
           <a:xfrm>
-            <a:off x="467916" y="2279653"/>
-            <a:ext cx="5915025" cy="3803649"/>
+            <a:off x="467916" y="1367791"/>
+            <a:ext cx="5915025" cy="2282190"/>
           </a:xfrm>
         </p:spPr>
         <p:txBody>
@@ -881,8 +885,8 @@
         </p:nvSpPr>
         <p:spPr>
           <a:xfrm>
-            <a:off x="467916" y="6119286"/>
-            <a:ext cx="5915025" cy="2000249"/>
+            <a:off x="467916" y="3671571"/>
+            <a:ext cx="5915025" cy="1200150"/>
           </a:xfrm>
         </p:spPr>
         <p:txBody>
@@ -1003,7 +1007,7 @@
           <a:p>
             <a:fld id="{2CC38724-DE8D-4C18-A4F6-D9BF68B2D7FD}" type="datetimeFigureOut">
               <a:rPr lang="en-US" smtClean="0"/>
-              <a:t>3/5/2018</a:t>
+              <a:t>3/6/2018</a:t>
             </a:fld>
             <a:endParaRPr lang="en-US"/>
           </a:p>
@@ -1054,7 +1058,7 @@
     </p:spTree>
     <p:extLst>
       <p:ext uri="{BB962C8B-B14F-4D97-AF65-F5344CB8AC3E}">
-        <p14:creationId xmlns:p14="http://schemas.microsoft.com/office/powerpoint/2010/main" val="1836909427"/>
+        <p14:creationId xmlns:p14="http://schemas.microsoft.com/office/powerpoint/2010/main" val="1109337092"/>
       </p:ext>
     </p:extLst>
   </p:cSld>
@@ -1116,8 +1120,8 @@
         </p:nvSpPr>
         <p:spPr>
           <a:xfrm>
-            <a:off x="471488" y="2434167"/>
-            <a:ext cx="2914650" cy="5801784"/>
+            <a:off x="471488" y="1460500"/>
+            <a:ext cx="2914650" cy="3481070"/>
           </a:xfrm>
         </p:spPr>
         <p:txBody>
@@ -1173,8 +1177,8 @@
         </p:nvSpPr>
         <p:spPr>
           <a:xfrm>
-            <a:off x="3471863" y="2434167"/>
-            <a:ext cx="2914650" cy="5801784"/>
+            <a:off x="3471863" y="1460500"/>
+            <a:ext cx="2914650" cy="3481070"/>
           </a:xfrm>
         </p:spPr>
         <p:txBody>
@@ -1235,7 +1239,7 @@
           <a:p>
             <a:fld id="{2CC38724-DE8D-4C18-A4F6-D9BF68B2D7FD}" type="datetimeFigureOut">
               <a:rPr lang="en-US" smtClean="0"/>
-              <a:t>3/5/2018</a:t>
+              <a:t>3/6/2018</a:t>
             </a:fld>
             <a:endParaRPr lang="en-US"/>
           </a:p>
@@ -1286,7 +1290,7 @@
     </p:spTree>
     <p:extLst>
       <p:ext uri="{BB962C8B-B14F-4D97-AF65-F5344CB8AC3E}">
-        <p14:creationId xmlns:p14="http://schemas.microsoft.com/office/powerpoint/2010/main" val="3027321209"/>
+        <p14:creationId xmlns:p14="http://schemas.microsoft.com/office/powerpoint/2010/main" val="4212292238"/>
       </p:ext>
     </p:extLst>
   </p:cSld>
@@ -1325,8 +1329,8 @@
         </p:nvSpPr>
         <p:spPr>
           <a:xfrm>
-            <a:off x="472381" y="486836"/>
-            <a:ext cx="5915025" cy="1767417"/>
+            <a:off x="472381" y="292101"/>
+            <a:ext cx="5915025" cy="1060450"/>
           </a:xfrm>
         </p:spPr>
         <p:txBody>
@@ -1353,8 +1357,8 @@
         </p:nvSpPr>
         <p:spPr>
           <a:xfrm>
-            <a:off x="472381" y="2241551"/>
-            <a:ext cx="2901255" cy="1098549"/>
+            <a:off x="472381" y="1344930"/>
+            <a:ext cx="2901255" cy="659130"/>
           </a:xfrm>
         </p:spPr>
         <p:txBody>
@@ -1418,8 +1422,8 @@
         </p:nvSpPr>
         <p:spPr>
           <a:xfrm>
-            <a:off x="472381" y="3340100"/>
-            <a:ext cx="2901255" cy="4912784"/>
+            <a:off x="472381" y="2004060"/>
+            <a:ext cx="2901255" cy="2947670"/>
           </a:xfrm>
         </p:spPr>
         <p:txBody>
@@ -1475,8 +1479,8 @@
         </p:nvSpPr>
         <p:spPr>
           <a:xfrm>
-            <a:off x="3471863" y="2241551"/>
-            <a:ext cx="2915543" cy="1098549"/>
+            <a:off x="3471863" y="1344930"/>
+            <a:ext cx="2915543" cy="659130"/>
           </a:xfrm>
         </p:spPr>
         <p:txBody>
@@ -1540,8 +1544,8 @@
         </p:nvSpPr>
         <p:spPr>
           <a:xfrm>
-            <a:off x="3471863" y="3340100"/>
-            <a:ext cx="2915543" cy="4912784"/>
+            <a:off x="3471863" y="2004060"/>
+            <a:ext cx="2915543" cy="2947670"/>
           </a:xfrm>
         </p:spPr>
         <p:txBody>
@@ -1602,7 +1606,7 @@
           <a:p>
             <a:fld id="{2CC38724-DE8D-4C18-A4F6-D9BF68B2D7FD}" type="datetimeFigureOut">
               <a:rPr lang="en-US" smtClean="0"/>
-              <a:t>3/5/2018</a:t>
+              <a:t>3/6/2018</a:t>
             </a:fld>
             <a:endParaRPr lang="en-US"/>
           </a:p>
@@ -1653,7 +1657,7 @@
     </p:spTree>
     <p:extLst>
       <p:ext uri="{BB962C8B-B14F-4D97-AF65-F5344CB8AC3E}">
-        <p14:creationId xmlns:p14="http://schemas.microsoft.com/office/powerpoint/2010/main" val="555141845"/>
+        <p14:creationId xmlns:p14="http://schemas.microsoft.com/office/powerpoint/2010/main" val="2031815577"/>
       </p:ext>
     </p:extLst>
   </p:cSld>
@@ -1720,7 +1724,7 @@
           <a:p>
             <a:fld id="{2CC38724-DE8D-4C18-A4F6-D9BF68B2D7FD}" type="datetimeFigureOut">
               <a:rPr lang="en-US" smtClean="0"/>
-              <a:t>3/5/2018</a:t>
+              <a:t>3/6/2018</a:t>
             </a:fld>
             <a:endParaRPr lang="en-US"/>
           </a:p>
@@ -1771,7 +1775,7 @@
     </p:spTree>
     <p:extLst>
       <p:ext uri="{BB962C8B-B14F-4D97-AF65-F5344CB8AC3E}">
-        <p14:creationId xmlns:p14="http://schemas.microsoft.com/office/powerpoint/2010/main" val="3893447907"/>
+        <p14:creationId xmlns:p14="http://schemas.microsoft.com/office/powerpoint/2010/main" val="3369415796"/>
       </p:ext>
     </p:extLst>
   </p:cSld>
@@ -1815,7 +1819,7 @@
           <a:p>
             <a:fld id="{2CC38724-DE8D-4C18-A4F6-D9BF68B2D7FD}" type="datetimeFigureOut">
               <a:rPr lang="en-US" smtClean="0"/>
-              <a:t>3/5/2018</a:t>
+              <a:t>3/6/2018</a:t>
             </a:fld>
             <a:endParaRPr lang="en-US"/>
           </a:p>
@@ -1866,7 +1870,7 @@
     </p:spTree>
     <p:extLst>
       <p:ext uri="{BB962C8B-B14F-4D97-AF65-F5344CB8AC3E}">
-        <p14:creationId xmlns:p14="http://schemas.microsoft.com/office/powerpoint/2010/main" val="3299180545"/>
+        <p14:creationId xmlns:p14="http://schemas.microsoft.com/office/powerpoint/2010/main" val="3216516006"/>
       </p:ext>
     </p:extLst>
   </p:cSld>
@@ -1905,8 +1909,8 @@
         </p:nvSpPr>
         <p:spPr>
           <a:xfrm>
-            <a:off x="472381" y="609600"/>
-            <a:ext cx="2211884" cy="2133600"/>
+            <a:off x="472381" y="365760"/>
+            <a:ext cx="2211884" cy="1280160"/>
           </a:xfrm>
         </p:spPr>
         <p:txBody>
@@ -1937,8 +1941,8 @@
         </p:nvSpPr>
         <p:spPr>
           <a:xfrm>
-            <a:off x="2915543" y="1316569"/>
-            <a:ext cx="3471863" cy="6498167"/>
+            <a:off x="2915543" y="789941"/>
+            <a:ext cx="3471863" cy="3898900"/>
           </a:xfrm>
         </p:spPr>
         <p:txBody>
@@ -2022,8 +2026,8 @@
         </p:nvSpPr>
         <p:spPr>
           <a:xfrm>
-            <a:off x="472381" y="2743200"/>
-            <a:ext cx="2211884" cy="5082117"/>
+            <a:off x="472381" y="1645920"/>
+            <a:ext cx="2211884" cy="3049270"/>
           </a:xfrm>
         </p:spPr>
         <p:txBody>
@@ -2092,7 +2096,7 @@
           <a:p>
             <a:fld id="{2CC38724-DE8D-4C18-A4F6-D9BF68B2D7FD}" type="datetimeFigureOut">
               <a:rPr lang="en-US" smtClean="0"/>
-              <a:t>3/5/2018</a:t>
+              <a:t>3/6/2018</a:t>
             </a:fld>
             <a:endParaRPr lang="en-US"/>
           </a:p>
@@ -2143,7 +2147,7 @@
     </p:spTree>
     <p:extLst>
       <p:ext uri="{BB962C8B-B14F-4D97-AF65-F5344CB8AC3E}">
-        <p14:creationId xmlns:p14="http://schemas.microsoft.com/office/powerpoint/2010/main" val="296836149"/>
+        <p14:creationId xmlns:p14="http://schemas.microsoft.com/office/powerpoint/2010/main" val="1307708282"/>
       </p:ext>
     </p:extLst>
   </p:cSld>
@@ -2182,8 +2186,8 @@
         </p:nvSpPr>
         <p:spPr>
           <a:xfrm>
-            <a:off x="472381" y="609600"/>
-            <a:ext cx="2211884" cy="2133600"/>
+            <a:off x="472381" y="365760"/>
+            <a:ext cx="2211884" cy="1280160"/>
           </a:xfrm>
         </p:spPr>
         <p:txBody>
@@ -2214,8 +2218,8 @@
         </p:nvSpPr>
         <p:spPr>
           <a:xfrm>
-            <a:off x="2915543" y="1316569"/>
-            <a:ext cx="3471863" cy="6498167"/>
+            <a:off x="2915543" y="789941"/>
+            <a:ext cx="3471863" cy="3898900"/>
           </a:xfrm>
         </p:spPr>
         <p:txBody>
@@ -2279,8 +2283,8 @@
         </p:nvSpPr>
         <p:spPr>
           <a:xfrm>
-            <a:off x="472381" y="2743200"/>
-            <a:ext cx="2211884" cy="5082117"/>
+            <a:off x="472381" y="1645920"/>
+            <a:ext cx="2211884" cy="3049270"/>
           </a:xfrm>
         </p:spPr>
         <p:txBody>
@@ -2349,7 +2353,7 @@
           <a:p>
             <a:fld id="{2CC38724-DE8D-4C18-A4F6-D9BF68B2D7FD}" type="datetimeFigureOut">
               <a:rPr lang="en-US" smtClean="0"/>
-              <a:t>3/5/2018</a:t>
+              <a:t>3/6/2018</a:t>
             </a:fld>
             <a:endParaRPr lang="en-US"/>
           </a:p>
@@ -2400,7 +2404,7 @@
     </p:spTree>
     <p:extLst>
       <p:ext uri="{BB962C8B-B14F-4D97-AF65-F5344CB8AC3E}">
-        <p14:creationId xmlns:p14="http://schemas.microsoft.com/office/powerpoint/2010/main" val="3289279728"/>
+        <p14:creationId xmlns:p14="http://schemas.microsoft.com/office/powerpoint/2010/main" val="2516446963"/>
       </p:ext>
     </p:extLst>
   </p:cSld>
@@ -2444,8 +2448,8 @@
         </p:nvSpPr>
         <p:spPr>
           <a:xfrm>
-            <a:off x="471488" y="486836"/>
-            <a:ext cx="5915025" cy="1767417"/>
+            <a:off x="471488" y="292101"/>
+            <a:ext cx="5915025" cy="1060450"/>
           </a:xfrm>
           <a:prstGeom prst="rect">
             <a:avLst/>
@@ -2477,8 +2481,8 @@
         </p:nvSpPr>
         <p:spPr>
           <a:xfrm>
-            <a:off x="471488" y="2434167"/>
-            <a:ext cx="5915025" cy="5801784"/>
+            <a:off x="471488" y="1460500"/>
+            <a:ext cx="5915025" cy="3481070"/>
           </a:xfrm>
           <a:prstGeom prst="rect">
             <a:avLst/>
@@ -2539,8 +2543,8 @@
         </p:nvSpPr>
         <p:spPr>
           <a:xfrm>
-            <a:off x="471488" y="8475136"/>
-            <a:ext cx="1543050" cy="486833"/>
+            <a:off x="471488" y="5085081"/>
+            <a:ext cx="1543050" cy="292100"/>
           </a:xfrm>
           <a:prstGeom prst="rect">
             <a:avLst/>
@@ -2562,7 +2566,7 @@
           <a:p>
             <a:fld id="{2CC38724-DE8D-4C18-A4F6-D9BF68B2D7FD}" type="datetimeFigureOut">
               <a:rPr lang="en-US" smtClean="0"/>
-              <a:t>3/5/2018</a:t>
+              <a:t>3/6/2018</a:t>
             </a:fld>
             <a:endParaRPr lang="en-US"/>
           </a:p>
@@ -2580,8 +2584,8 @@
         </p:nvSpPr>
         <p:spPr>
           <a:xfrm>
-            <a:off x="2271713" y="8475136"/>
-            <a:ext cx="2314575" cy="486833"/>
+            <a:off x="2271713" y="5085081"/>
+            <a:ext cx="2314575" cy="292100"/>
           </a:xfrm>
           <a:prstGeom prst="rect">
             <a:avLst/>
@@ -2617,8 +2621,8 @@
         </p:nvSpPr>
         <p:spPr>
           <a:xfrm>
-            <a:off x="4843463" y="8475136"/>
-            <a:ext cx="1543050" cy="486833"/>
+            <a:off x="4843463" y="5085081"/>
+            <a:ext cx="1543050" cy="292100"/>
           </a:xfrm>
           <a:prstGeom prst="rect">
             <a:avLst/>
@@ -2649,23 +2653,23 @@
     </p:spTree>
     <p:extLst>
       <p:ext uri="{BB962C8B-B14F-4D97-AF65-F5344CB8AC3E}">
-        <p14:creationId xmlns:p14="http://schemas.microsoft.com/office/powerpoint/2010/main" val="4037740820"/>
+        <p14:creationId xmlns:p14="http://schemas.microsoft.com/office/powerpoint/2010/main" val="313154315"/>
       </p:ext>
     </p:extLst>
   </p:cSld>
   <p:clrMap bg1="lt1" tx1="dk1" bg2="lt2" tx2="dk2" accent1="accent1" accent2="accent2" accent3="accent3" accent4="accent4" accent5="accent5" accent6="accent6" hlink="hlink" folHlink="folHlink"/>
   <p:sldLayoutIdLst>
-    <p:sldLayoutId id="2147483661" r:id="rId1"/>
-    <p:sldLayoutId id="2147483662" r:id="rId2"/>
-    <p:sldLayoutId id="2147483663" r:id="rId3"/>
-    <p:sldLayoutId id="2147483664" r:id="rId4"/>
-    <p:sldLayoutId id="2147483665" r:id="rId5"/>
-    <p:sldLayoutId id="2147483666" r:id="rId6"/>
-    <p:sldLayoutId id="2147483667" r:id="rId7"/>
-    <p:sldLayoutId id="2147483668" r:id="rId8"/>
-    <p:sldLayoutId id="2147483669" r:id="rId9"/>
-    <p:sldLayoutId id="2147483670" r:id="rId10"/>
-    <p:sldLayoutId id="2147483671" r:id="rId11"/>
+    <p:sldLayoutId id="2147483673" r:id="rId1"/>
+    <p:sldLayoutId id="2147483674" r:id="rId2"/>
+    <p:sldLayoutId id="2147483675" r:id="rId3"/>
+    <p:sldLayoutId id="2147483676" r:id="rId4"/>
+    <p:sldLayoutId id="2147483677" r:id="rId5"/>
+    <p:sldLayoutId id="2147483678" r:id="rId6"/>
+    <p:sldLayoutId id="2147483679" r:id="rId7"/>
+    <p:sldLayoutId id="2147483680" r:id="rId8"/>
+    <p:sldLayoutId id="2147483681" r:id="rId9"/>
+    <p:sldLayoutId id="2147483682" r:id="rId10"/>
+    <p:sldLayoutId id="2147483683" r:id="rId11"/>
   </p:sldLayoutIdLst>
   <p:txStyles>
     <p:titleStyle>
@@ -2975,7 +2979,7 @@
         </p:nvSpPr>
         <p:spPr>
           <a:xfrm>
-            <a:off x="809883" y="492087"/>
+            <a:off x="836389" y="399323"/>
             <a:ext cx="2644242" cy="1618995"/>
           </a:xfrm>
           <a:prstGeom prst="roundRect">
@@ -3078,7 +3082,7 @@
         </p:nvSpPr>
         <p:spPr>
           <a:xfrm>
-            <a:off x="2413248" y="1675575"/>
+            <a:off x="2439753" y="1582810"/>
             <a:ext cx="617220" cy="257175"/>
           </a:xfrm>
           <a:prstGeom prst="flowChartInputOutput">
@@ -3140,7 +3144,7 @@
         </p:nvSpPr>
         <p:spPr>
           <a:xfrm>
-            <a:off x="2489709" y="1635585"/>
+            <a:off x="2516213" y="1542820"/>
             <a:ext cx="617220" cy="257175"/>
           </a:xfrm>
           <a:prstGeom prst="flowChartInputOutput">
@@ -3202,7 +3206,7 @@
         </p:nvSpPr>
         <p:spPr>
           <a:xfrm>
-            <a:off x="1677401" y="1675575"/>
+            <a:off x="1703907" y="1582810"/>
             <a:ext cx="617220" cy="257175"/>
           </a:xfrm>
           <a:prstGeom prst="flowChartInputOutput">
@@ -3264,7 +3268,7 @@
         </p:nvSpPr>
         <p:spPr>
           <a:xfrm>
-            <a:off x="1753862" y="1635585"/>
+            <a:off x="1780367" y="1542820"/>
             <a:ext cx="617220" cy="257175"/>
           </a:xfrm>
           <a:prstGeom prst="flowChartInputOutput">
@@ -3326,7 +3330,7 @@
         </p:nvSpPr>
         <p:spPr>
           <a:xfrm>
-            <a:off x="929320" y="1675575"/>
+            <a:off x="955825" y="1582810"/>
             <a:ext cx="617220" cy="257175"/>
           </a:xfrm>
           <a:prstGeom prst="flowChartInputOutput">
@@ -3388,7 +3392,7 @@
         </p:nvSpPr>
         <p:spPr>
           <a:xfrm>
-            <a:off x="1005781" y="1635585"/>
+            <a:off x="1032287" y="1542820"/>
             <a:ext cx="617220" cy="257175"/>
           </a:xfrm>
           <a:prstGeom prst="flowChartInputOutput">
@@ -3450,8 +3454,8 @@
         </p:nvSpPr>
         <p:spPr>
           <a:xfrm>
-            <a:off x="1692851" y="745056"/>
-            <a:ext cx="878306" cy="457201"/>
+            <a:off x="1719356" y="652291"/>
+            <a:ext cx="878307" cy="457202"/>
           </a:xfrm>
           <a:prstGeom prst="roundRect">
             <a:avLst/>
@@ -3528,7 +3532,7 @@
         </p:nvSpPr>
         <p:spPr>
           <a:xfrm>
-            <a:off x="1823394" y="1592531"/>
+            <a:off x="1849898" y="1499767"/>
             <a:ext cx="617220" cy="257175"/>
           </a:xfrm>
           <a:prstGeom prst="flowChartInputOutput">
@@ -3575,7 +3579,7 @@
           <a:p>
             <a:pPr algn="ctr"/>
             <a:r>
-              <a:rPr lang="en-US" sz="1013" dirty="0" smtClean="0">
+              <a:rPr lang="en-US" sz="1013" dirty="0">
                 <a:solidFill>
                   <a:srgbClr val="FFFF00"/>
                 </a:solidFill>
@@ -3583,7 +3587,7 @@
               <a:t>.</a:t>
             </a:r>
             <a:r>
-              <a:rPr lang="en-US" sz="1013" dirty="0" err="1" smtClean="0">
+              <a:rPr lang="en-US" sz="1013" dirty="0" err="1">
                 <a:solidFill>
                   <a:srgbClr val="FFFF00"/>
                 </a:solidFill>
@@ -3606,7 +3610,7 @@
         </p:nvSpPr>
         <p:spPr>
           <a:xfrm>
-            <a:off x="1075632" y="1592531"/>
+            <a:off x="1102137" y="1499767"/>
             <a:ext cx="617220" cy="257175"/>
           </a:xfrm>
           <a:prstGeom prst="flowChartInputOutput">
@@ -3673,7 +3677,7 @@
         </p:nvSpPr>
         <p:spPr>
           <a:xfrm>
-            <a:off x="2571157" y="1592531"/>
+            <a:off x="2597662" y="1499767"/>
             <a:ext cx="617220" cy="257175"/>
           </a:xfrm>
           <a:prstGeom prst="flowChartInputOutput">
@@ -3754,8 +3758,8 @@
         </p:nvCxnSpPr>
         <p:spPr>
           <a:xfrm>
-            <a:off x="2132004" y="1202257"/>
-            <a:ext cx="0" cy="390274"/>
+            <a:off x="2158508" y="1109491"/>
+            <a:ext cx="0" cy="390273"/>
           </a:xfrm>
           <a:prstGeom prst="straightConnector1">
             <a:avLst/>
@@ -3796,8 +3800,8 @@
         </p:nvCxnSpPr>
         <p:spPr>
           <a:xfrm rot="16200000" flipH="1">
-            <a:off x="2310749" y="1023512"/>
-            <a:ext cx="390274" cy="747763"/>
+            <a:off x="2337256" y="930746"/>
+            <a:ext cx="390273" cy="747763"/>
           </a:xfrm>
           <a:prstGeom prst="bentConnector3">
             <a:avLst/>
@@ -3838,8 +3842,8 @@
         </p:nvCxnSpPr>
         <p:spPr>
           <a:xfrm rot="5400000">
-            <a:off x="1593848" y="1054373"/>
-            <a:ext cx="390274" cy="686041"/>
+            <a:off x="1620355" y="961608"/>
+            <a:ext cx="390273" cy="686042"/>
           </a:xfrm>
           <a:prstGeom prst="bentConnector3">
             <a:avLst/>
@@ -3877,8 +3881,8 @@
         </p:nvSpPr>
         <p:spPr>
           <a:xfrm>
-            <a:off x="844824" y="4595651"/>
-            <a:ext cx="812796" cy="660872"/>
+            <a:off x="871329" y="4502886"/>
+            <a:ext cx="812797" cy="660872"/>
           </a:xfrm>
           <a:prstGeom prst="roundRect">
             <a:avLst/>
@@ -3958,8 +3962,8 @@
         </p:nvSpPr>
         <p:spPr>
           <a:xfrm>
-            <a:off x="812069" y="3881276"/>
-            <a:ext cx="878306" cy="457201"/>
+            <a:off x="838574" y="3788511"/>
+            <a:ext cx="878307" cy="457202"/>
           </a:xfrm>
           <a:prstGeom prst="roundRect">
             <a:avLst/>
@@ -4031,7 +4035,7 @@
         </p:nvCxnSpPr>
         <p:spPr>
           <a:xfrm rot="10800000" flipV="1">
-            <a:off x="1251222" y="2887638"/>
+            <a:off x="1277727" y="2794873"/>
             <a:ext cx="502640" cy="993638"/>
           </a:xfrm>
           <a:prstGeom prst="bentConnector2">
@@ -4074,7 +4078,7 @@
         </p:nvCxnSpPr>
         <p:spPr>
           <a:xfrm rot="10800000" flipV="1">
-            <a:off x="1251222" y="3500937"/>
+            <a:off x="1277730" y="3408172"/>
             <a:ext cx="515795" cy="380338"/>
           </a:xfrm>
           <a:prstGeom prst="bentConnector2">
@@ -4114,7 +4118,7 @@
         </p:nvSpPr>
         <p:spPr>
           <a:xfrm>
-            <a:off x="917970" y="4926087"/>
+            <a:off x="944475" y="4833324"/>
             <a:ext cx="617220" cy="257175"/>
           </a:xfrm>
           <a:prstGeom prst="flowChartInputOutput">
@@ -4184,8 +4188,8 @@
         </p:nvCxnSpPr>
         <p:spPr>
           <a:xfrm rot="5400000">
-            <a:off x="1122635" y="4467064"/>
-            <a:ext cx="257175" cy="1"/>
+            <a:off x="1149142" y="4374300"/>
+            <a:ext cx="257175" cy="2"/>
           </a:xfrm>
           <a:prstGeom prst="bentConnector3">
             <a:avLst/>
@@ -4223,8 +4227,8 @@
         </p:nvGrpSpPr>
         <p:grpSpPr>
           <a:xfrm>
-            <a:off x="2892819" y="2608910"/>
-            <a:ext cx="1363368" cy="557454"/>
+            <a:off x="2919324" y="2516145"/>
+            <a:ext cx="1363368" cy="557453"/>
             <a:chOff x="2657600" y="3493715"/>
             <a:chExt cx="2423765" cy="991030"/>
           </a:xfrm>
@@ -4432,7 +4436,7 @@
             <a:p>
               <a:pPr algn="ctr"/>
               <a:r>
-                <a:rPr lang="en-US" sz="1013" dirty="0" smtClean="0">
+                <a:rPr lang="en-US" sz="1013" dirty="0">
                   <a:solidFill>
                     <a:srgbClr val="7030A0"/>
                   </a:solidFill>
@@ -4440,7 +4444,7 @@
                 <a:t>.</a:t>
               </a:r>
               <a:r>
-                <a:rPr lang="en-US" sz="1013" dirty="0" err="1" smtClean="0">
+                <a:rPr lang="en-US" sz="1013" dirty="0" err="1">
                   <a:solidFill>
                     <a:srgbClr val="7030A0"/>
                   </a:solidFill>
@@ -4464,8 +4468,8 @@
         </p:nvSpPr>
         <p:spPr>
           <a:xfrm>
-            <a:off x="1753862" y="2659037"/>
-            <a:ext cx="878306" cy="457201"/>
+            <a:off x="1780368" y="2566271"/>
+            <a:ext cx="878307" cy="457202"/>
           </a:xfrm>
           <a:prstGeom prst="roundRect">
             <a:avLst/>
@@ -4542,8 +4546,8 @@
         </p:nvGrpSpPr>
         <p:grpSpPr>
           <a:xfrm>
-            <a:off x="2892818" y="3221003"/>
-            <a:ext cx="1363368" cy="557454"/>
+            <a:off x="2919324" y="3128239"/>
+            <a:ext cx="1363368" cy="557453"/>
             <a:chOff x="2657600" y="3493715"/>
             <a:chExt cx="2423765" cy="991030"/>
           </a:xfrm>
@@ -4783,8 +4787,8 @@
         </p:nvSpPr>
         <p:spPr>
           <a:xfrm>
-            <a:off x="1767016" y="3272337"/>
-            <a:ext cx="878306" cy="457201"/>
+            <a:off x="1793521" y="3179571"/>
+            <a:ext cx="878307" cy="457202"/>
           </a:xfrm>
           <a:prstGeom prst="roundRect">
             <a:avLst/>
@@ -4864,8 +4868,8 @@
         </p:nvCxnSpPr>
         <p:spPr>
           <a:xfrm flipV="1">
-            <a:off x="2632168" y="2887637"/>
-            <a:ext cx="260651" cy="1"/>
+            <a:off x="2658674" y="2794871"/>
+            <a:ext cx="260652" cy="2"/>
           </a:xfrm>
           <a:prstGeom prst="bentConnector3">
             <a:avLst/>
@@ -4906,8 +4910,8 @@
         </p:nvCxnSpPr>
         <p:spPr>
           <a:xfrm flipV="1">
-            <a:off x="2645322" y="3499730"/>
-            <a:ext cx="247496" cy="1208"/>
+            <a:off x="2671828" y="3406965"/>
+            <a:ext cx="247497" cy="1208"/>
           </a:xfrm>
           <a:prstGeom prst="bentConnector3">
             <a:avLst/>
@@ -4948,8 +4952,8 @@
         </p:nvCxnSpPr>
         <p:spPr>
           <a:xfrm flipH="1">
-            <a:off x="1690375" y="2887637"/>
-            <a:ext cx="2565812" cy="1222239"/>
+            <a:off x="1716881" y="2794873"/>
+            <a:ext cx="2565812" cy="1222238"/>
           </a:xfrm>
           <a:prstGeom prst="bentConnector3">
             <a:avLst>
@@ -4992,8 +4996,8 @@
         </p:nvCxnSpPr>
         <p:spPr>
           <a:xfrm flipH="1">
-            <a:off x="1690375" y="3499730"/>
-            <a:ext cx="2565811" cy="610147"/>
+            <a:off x="1716881" y="3406965"/>
+            <a:ext cx="2565812" cy="610147"/>
           </a:xfrm>
           <a:prstGeom prst="bentConnector3">
             <a:avLst>
@@ -5033,7 +5037,7 @@
         </p:nvSpPr>
         <p:spPr>
           <a:xfrm>
-            <a:off x="175056" y="1017590"/>
+            <a:off x="201563" y="924825"/>
             <a:ext cx="386687" cy="369332"/>
           </a:xfrm>
           <a:prstGeom prst="rect">
@@ -5048,7 +5052,7 @@
           <a:lstStyle/>
           <a:p>
             <a:r>
-              <a:rPr lang="en-US" dirty="0" smtClean="0"/>
+              <a:rPr lang="en-US" dirty="0"/>
               <a:t>A)</a:t>
             </a:r>
             <a:endParaRPr lang="en-US" dirty="0"/>
@@ -5063,7 +5067,7 @@
         </p:nvSpPr>
         <p:spPr>
           <a:xfrm>
-            <a:off x="201827" y="3620137"/>
+            <a:off x="228334" y="3527372"/>
             <a:ext cx="386687" cy="369332"/>
           </a:xfrm>
           <a:prstGeom prst="rect">
@@ -5078,7 +5082,7 @@
           <a:lstStyle/>
           <a:p>
             <a:r>
-              <a:rPr lang="en-US" dirty="0" smtClean="0"/>
+              <a:rPr lang="en-US" dirty="0"/>
               <a:t>B)</a:t>
             </a:r>
             <a:endParaRPr lang="en-US" dirty="0"/>
@@ -5093,8 +5097,8 @@
         </p:nvSpPr>
         <p:spPr>
           <a:xfrm>
-            <a:off x="3650023" y="4685342"/>
-            <a:ext cx="2715906" cy="369332"/>
+            <a:off x="3676529" y="4592577"/>
+            <a:ext cx="2715907" cy="369332"/>
           </a:xfrm>
           <a:prstGeom prst="rect">
             <a:avLst/>
@@ -5108,7 +5112,7 @@
           <a:lstStyle/>
           <a:p>
             <a:r>
-              <a:rPr lang="en-US" dirty="0" err="1" smtClean="0">
+              <a:rPr lang="en-US" dirty="0" err="1">
                 <a:solidFill>
                   <a:srgbClr val="7030A0"/>
                 </a:solidFill>
@@ -5117,7 +5121,7 @@
               <a:t>rw_scen_aggregate</a:t>
             </a:r>
             <a:r>
-              <a:rPr lang="en-US" dirty="0" smtClean="0">
+              <a:rPr lang="en-US" dirty="0">
                 <a:solidFill>
                   <a:srgbClr val="7030A0"/>
                 </a:solidFill>
@@ -5142,8 +5146,8 @@
         </p:nvSpPr>
         <p:spPr>
           <a:xfrm>
-            <a:off x="3650023" y="828918"/>
-            <a:ext cx="2715906" cy="923330"/>
+            <a:off x="3676529" y="736153"/>
+            <a:ext cx="2715907" cy="923330"/>
           </a:xfrm>
           <a:prstGeom prst="rect">
             <a:avLst/>
@@ -5157,7 +5161,7 @@
           <a:lstStyle/>
           <a:p>
             <a:r>
-              <a:rPr lang="en-US" dirty="0" err="1" smtClean="0">
+              <a:rPr lang="en-US" dirty="0" err="1">
                 <a:solidFill>
                   <a:schemeClr val="accent1">
                     <a:lumMod val="75000"/>
@@ -5168,7 +5172,7 @@
               <a:t>read_rw_csv</a:t>
             </a:r>
             <a:r>
-              <a:rPr lang="en-US" dirty="0" smtClean="0">
+              <a:rPr lang="en-US" dirty="0">
                 <a:solidFill>
                   <a:schemeClr val="accent1">
                     <a:lumMod val="75000"/>
@@ -5178,7 +5182,7 @@
               </a:rPr>
               <a:t>()</a:t>
             </a:r>
-            <a:endParaRPr lang="en-US" dirty="0" smtClean="0">
+            <a:endParaRPr lang="en-US" dirty="0">
               <a:solidFill>
                 <a:srgbClr val="7030A0"/>
               </a:solidFill>
@@ -5187,7 +5191,7 @@
           </a:p>
           <a:p>
             <a:r>
-              <a:rPr lang="en-US" dirty="0" err="1" smtClean="0">
+              <a:rPr lang="en-US" dirty="0" err="1">
                 <a:solidFill>
                   <a:srgbClr val="7030A0"/>
                 </a:solidFill>
@@ -5196,7 +5200,7 @@
               <a:t>read_rdf</a:t>
             </a:r>
             <a:r>
-              <a:rPr lang="en-US" dirty="0" smtClean="0">
+              <a:rPr lang="en-US" dirty="0">
                 <a:solidFill>
                   <a:srgbClr val="7030A0"/>
                 </a:solidFill>
@@ -5207,7 +5211,7 @@
           </a:p>
           <a:p>
             <a:r>
-              <a:rPr lang="en-US" dirty="0" err="1" smtClean="0">
+              <a:rPr lang="en-US" dirty="0" err="1">
                 <a:solidFill>
                   <a:srgbClr val="7030A0"/>
                 </a:solidFill>
@@ -5216,7 +5220,7 @@
               <a:t>rdf_aggregate</a:t>
             </a:r>
             <a:r>
-              <a:rPr lang="en-US" dirty="0" smtClean="0">
+              <a:rPr lang="en-US" dirty="0">
                 <a:solidFill>
                   <a:srgbClr val="7030A0"/>
                 </a:solidFill>
@@ -5231,43 +5235,6 @@
     <p:extLst>
       <p:ext uri="{BB962C8B-B14F-4D97-AF65-F5344CB8AC3E}">
         <p14:creationId xmlns:p14="http://schemas.microsoft.com/office/powerpoint/2010/main" val="2818882276"/>
-      </p:ext>
-    </p:extLst>
-  </p:cSld>
-  <p:clrMapOvr>
-    <a:masterClrMapping/>
-  </p:clrMapOvr>
-  <p:timing>
-    <p:tnLst>
-      <p:par>
-        <p:cTn id="1" dur="indefinite" restart="never" nodeType="tmRoot"/>
-      </p:par>
-    </p:tnLst>
-  </p:timing>
-</p:sld>
-</file>
-
-<file path=ppt/slides/slide2.xml><?xml version="1.0" encoding="utf-8"?>
-<p:sld xmlns:a="http://schemas.openxmlformats.org/drawingml/2006/main" xmlns:r="http://schemas.openxmlformats.org/officeDocument/2006/relationships" xmlns:p="http://schemas.openxmlformats.org/presentationml/2006/main">
-  <p:cSld>
-    <p:spTree>
-      <p:nvGrpSpPr>
-        <p:cNvPr id="1" name=""/>
-        <p:cNvGrpSpPr/>
-        <p:nvPr/>
-      </p:nvGrpSpPr>
-      <p:grpSpPr>
-        <a:xfrm>
-          <a:off x="0" y="0"/>
-          <a:ext cx="0" cy="0"/>
-          <a:chOff x="0" y="0"/>
-          <a:chExt cx="0" cy="0"/>
-        </a:xfrm>
-      </p:grpSpPr>
-    </p:spTree>
-    <p:extLst>
-      <p:ext uri="{BB962C8B-B14F-4D97-AF65-F5344CB8AC3E}">
-        <p14:creationId xmlns:p14="http://schemas.microsoft.com/office/powerpoint/2010/main" val="355744032"/>
       </p:ext>
     </p:extLst>
   </p:cSld>

</xml_diff>